<commit_message>
Architecture diagram: remove "Web"
With the removal of BrowserPanel in 60c35eeb (Remove BrowserPanel,
2019-01-25), the application does not access the web any more.
</commit_message>
<xml_diff>
--- a/docs/diagrams/Architecture.pptx
+++ b/docs/diagrams/Architecture.pptx
@@ -208,7 +208,7 @@
           <a:p>
             <a:fld id="{F5CC4B3F-88C1-4FFA-B1B6-F41C21DC6924}" type="datetimeFigureOut">
               <a:rPr lang="en-US" smtClean="0"/>
-              <a:t>12/15/2018</a:t>
+              <a:t>5/29/2019</a:t>
             </a:fld>
             <a:endParaRPr lang="en-US"/>
           </a:p>
@@ -654,7 +654,7 @@
           <a:p>
             <a:fld id="{78C97017-6FC3-485B-9764-EAC9E56C1D49}" type="datetimeFigureOut">
               <a:rPr lang="en-US" smtClean="0"/>
-              <a:t>12/15/2018</a:t>
+              <a:t>5/29/2019</a:t>
             </a:fld>
             <a:endParaRPr lang="en-US"/>
           </a:p>
@@ -822,7 +822,7 @@
           <a:p>
             <a:fld id="{78C97017-6FC3-485B-9764-EAC9E56C1D49}" type="datetimeFigureOut">
               <a:rPr lang="en-US" smtClean="0"/>
-              <a:t>12/15/2018</a:t>
+              <a:t>5/29/2019</a:t>
             </a:fld>
             <a:endParaRPr lang="en-US"/>
           </a:p>
@@ -1000,7 +1000,7 @@
           <a:p>
             <a:fld id="{78C97017-6FC3-485B-9764-EAC9E56C1D49}" type="datetimeFigureOut">
               <a:rPr lang="en-US" smtClean="0"/>
-              <a:t>12/15/2018</a:t>
+              <a:t>5/29/2019</a:t>
             </a:fld>
             <a:endParaRPr lang="en-US"/>
           </a:p>
@@ -1168,7 +1168,7 @@
           <a:p>
             <a:fld id="{78C97017-6FC3-485B-9764-EAC9E56C1D49}" type="datetimeFigureOut">
               <a:rPr lang="en-US" smtClean="0"/>
-              <a:t>12/15/2018</a:t>
+              <a:t>5/29/2019</a:t>
             </a:fld>
             <a:endParaRPr lang="en-US"/>
           </a:p>
@@ -1413,7 +1413,7 @@
           <a:p>
             <a:fld id="{78C97017-6FC3-485B-9764-EAC9E56C1D49}" type="datetimeFigureOut">
               <a:rPr lang="en-US" smtClean="0"/>
-              <a:t>12/15/2018</a:t>
+              <a:t>5/29/2019</a:t>
             </a:fld>
             <a:endParaRPr lang="en-US"/>
           </a:p>
@@ -1698,7 +1698,7 @@
           <a:p>
             <a:fld id="{78C97017-6FC3-485B-9764-EAC9E56C1D49}" type="datetimeFigureOut">
               <a:rPr lang="en-US" smtClean="0"/>
-              <a:t>12/15/2018</a:t>
+              <a:t>5/29/2019</a:t>
             </a:fld>
             <a:endParaRPr lang="en-US"/>
           </a:p>
@@ -2117,7 +2117,7 @@
           <a:p>
             <a:fld id="{78C97017-6FC3-485B-9764-EAC9E56C1D49}" type="datetimeFigureOut">
               <a:rPr lang="en-US" smtClean="0"/>
-              <a:t>12/15/2018</a:t>
+              <a:t>5/29/2019</a:t>
             </a:fld>
             <a:endParaRPr lang="en-US"/>
           </a:p>
@@ -2234,7 +2234,7 @@
           <a:p>
             <a:fld id="{78C97017-6FC3-485B-9764-EAC9E56C1D49}" type="datetimeFigureOut">
               <a:rPr lang="en-US" smtClean="0"/>
-              <a:t>12/15/2018</a:t>
+              <a:t>5/29/2019</a:t>
             </a:fld>
             <a:endParaRPr lang="en-US"/>
           </a:p>
@@ -2329,7 +2329,7 @@
           <a:p>
             <a:fld id="{78C97017-6FC3-485B-9764-EAC9E56C1D49}" type="datetimeFigureOut">
               <a:rPr lang="en-US" smtClean="0"/>
-              <a:t>12/15/2018</a:t>
+              <a:t>5/29/2019</a:t>
             </a:fld>
             <a:endParaRPr lang="en-US"/>
           </a:p>
@@ -2604,7 +2604,7 @@
           <a:p>
             <a:fld id="{78C97017-6FC3-485B-9764-EAC9E56C1D49}" type="datetimeFigureOut">
               <a:rPr lang="en-US" smtClean="0"/>
-              <a:t>12/15/2018</a:t>
+              <a:t>5/29/2019</a:t>
             </a:fld>
             <a:endParaRPr lang="en-US"/>
           </a:p>
@@ -2856,7 +2856,7 @@
           <a:p>
             <a:fld id="{78C97017-6FC3-485B-9764-EAC9E56C1D49}" type="datetimeFigureOut">
               <a:rPr lang="en-US" smtClean="0"/>
-              <a:t>12/15/2018</a:t>
+              <a:t>5/29/2019</a:t>
             </a:fld>
             <a:endParaRPr lang="en-US"/>
           </a:p>
@@ -3067,7 +3067,7 @@
           <a:p>
             <a:fld id="{78C97017-6FC3-485B-9764-EAC9E56C1D49}" type="datetimeFigureOut">
               <a:rPr lang="en-US" smtClean="0"/>
-              <a:t>12/15/2018</a:t>
+              <a:t>5/29/2019</a:t>
             </a:fld>
             <a:endParaRPr lang="en-US"/>
           </a:p>
@@ -4168,101 +4168,6 @@
           </a:p>
         </p:txBody>
       </p:sp>
-      <p:sp>
-        <p:nvSpPr>
-          <p:cNvPr id="51" name="Cloud 50"/>
-          <p:cNvSpPr/>
-          <p:nvPr/>
-        </p:nvSpPr>
-        <p:spPr>
-          <a:xfrm>
-            <a:off x="2650069" y="1447800"/>
-            <a:ext cx="914400" cy="533400"/>
-          </a:xfrm>
-          <a:prstGeom prst="cloud">
-            <a:avLst/>
-          </a:prstGeom>
-          <a:solidFill>
-            <a:schemeClr val="bg1"/>
-          </a:solidFill>
-          <a:ln>
-            <a:solidFill>
-              <a:schemeClr val="tx1"/>
-            </a:solidFill>
-          </a:ln>
-        </p:spPr>
-        <p:style>
-          <a:lnRef idx="2">
-            <a:schemeClr val="accent1">
-              <a:shade val="50000"/>
-            </a:schemeClr>
-          </a:lnRef>
-          <a:fillRef idx="1">
-            <a:schemeClr val="accent1"/>
-          </a:fillRef>
-          <a:effectRef idx="0">
-            <a:schemeClr val="accent1"/>
-          </a:effectRef>
-          <a:fontRef idx="minor">
-            <a:schemeClr val="lt1"/>
-          </a:fontRef>
-        </p:style>
-        <p:txBody>
-          <a:bodyPr rtlCol="0" anchor="ctr"/>
-          <a:lstStyle/>
-          <a:p>
-            <a:pPr algn="ctr"/>
-            <a:r>
-              <a:rPr lang="en-US" sz="1400" dirty="0">
-                <a:solidFill>
-                  <a:schemeClr val="tx1"/>
-                </a:solidFill>
-              </a:rPr>
-              <a:t>Web</a:t>
-            </a:r>
-          </a:p>
-        </p:txBody>
-      </p:sp>
-      <p:cxnSp>
-        <p:nvCxnSpPr>
-          <p:cNvPr id="52" name="Elbow Connector 51"/>
-          <p:cNvCxnSpPr>
-            <a:stCxn id="2" idx="0"/>
-            <a:endCxn id="51" idx="2"/>
-          </p:cNvCxnSpPr>
-          <p:nvPr/>
-        </p:nvCxnSpPr>
-        <p:spPr>
-          <a:xfrm rot="5400000" flipH="1" flipV="1">
-            <a:off x="2222648" y="1760922"/>
-            <a:ext cx="476678" cy="383835"/>
-          </a:xfrm>
-          <a:prstGeom prst="bentConnector2">
-            <a:avLst/>
-          </a:prstGeom>
-          <a:ln w="28575">
-            <a:solidFill>
-              <a:srgbClr val="00B050"/>
-            </a:solidFill>
-            <a:prstDash val="sysDot"/>
-            <a:tailEnd type="arrow"/>
-          </a:ln>
-        </p:spPr>
-        <p:style>
-          <a:lnRef idx="1">
-            <a:schemeClr val="accent1"/>
-          </a:lnRef>
-          <a:fillRef idx="0">
-            <a:schemeClr val="accent1"/>
-          </a:fillRef>
-          <a:effectRef idx="0">
-            <a:schemeClr val="accent1"/>
-          </a:effectRef>
-          <a:fontRef idx="minor">
-            <a:schemeClr val="tx1"/>
-          </a:fontRef>
-        </p:style>
-      </p:cxnSp>
       <p:sp>
         <p:nvSpPr>
           <p:cNvPr id="23" name="Rectangle 62"/>

</xml_diff>